<commit_message>
DeveloperGuide: Update Ui class diagram
</commit_message>
<xml_diff>
--- a/docs/diagrams/RetrieveSequenceDiagram.pptx
+++ b/docs/diagrams/RetrieveSequenceDiagram.pptx
@@ -104,7 +104,16 @@
       </a:defRPr>
     </a:lvl9pPr>
   </p:defaultTextStyle>
+  <p:extLst>
+    <p:ext uri="{EFAFB233-063F-42B5-8137-9DF3F51BA10A}">
+      <p15:sldGuideLst xmlns:p15="http://schemas.microsoft.com/office/powerpoint/2012/main"/>
+    </p:ext>
+  </p:extLst>
 </p:presentation>
+</file>
+
+<file path=ppt/revisionInfo.xml><?xml version="1.0" encoding="utf-8"?>
+<p1510:revInfo xmlns:a="http://schemas.openxmlformats.org/drawingml/2006/main" xmlns:r="http://schemas.openxmlformats.org/officeDocument/2006/relationships" xmlns:p1510="http://schemas.microsoft.com/office/powerpoint/2015/10/main"/>
 </file>
 
 <file path=ppt/slideLayouts/slideLayout1.xml><?xml version="1.0" encoding="utf-8"?>
@@ -254,7 +263,7 @@
           <a:p>
             <a:fld id="{EDA0B0CA-96B7-4317-8230-3322BC274FA1}" type="datetimeFigureOut">
               <a:rPr lang="en-US" smtClean="0"/>
-              <a:t>10/22/2017</a:t>
+              <a:t>11/12/2017</a:t>
             </a:fld>
             <a:endParaRPr lang="en-US"/>
           </a:p>
@@ -452,7 +461,7 @@
           <a:p>
             <a:fld id="{EDA0B0CA-96B7-4317-8230-3322BC274FA1}" type="datetimeFigureOut">
               <a:rPr lang="en-US" smtClean="0"/>
-              <a:t>10/22/2017</a:t>
+              <a:t>11/12/2017</a:t>
             </a:fld>
             <a:endParaRPr lang="en-US"/>
           </a:p>
@@ -660,7 +669,7 @@
           <a:p>
             <a:fld id="{EDA0B0CA-96B7-4317-8230-3322BC274FA1}" type="datetimeFigureOut">
               <a:rPr lang="en-US" smtClean="0"/>
-              <a:t>10/22/2017</a:t>
+              <a:t>11/12/2017</a:t>
             </a:fld>
             <a:endParaRPr lang="en-US"/>
           </a:p>
@@ -858,7 +867,7 @@
           <a:p>
             <a:fld id="{EDA0B0CA-96B7-4317-8230-3322BC274FA1}" type="datetimeFigureOut">
               <a:rPr lang="en-US" smtClean="0"/>
-              <a:t>10/22/2017</a:t>
+              <a:t>11/12/2017</a:t>
             </a:fld>
             <a:endParaRPr lang="en-US"/>
           </a:p>
@@ -1133,7 +1142,7 @@
           <a:p>
             <a:fld id="{EDA0B0CA-96B7-4317-8230-3322BC274FA1}" type="datetimeFigureOut">
               <a:rPr lang="en-US" smtClean="0"/>
-              <a:t>10/22/2017</a:t>
+              <a:t>11/12/2017</a:t>
             </a:fld>
             <a:endParaRPr lang="en-US"/>
           </a:p>
@@ -1398,7 +1407,7 @@
           <a:p>
             <a:fld id="{EDA0B0CA-96B7-4317-8230-3322BC274FA1}" type="datetimeFigureOut">
               <a:rPr lang="en-US" smtClean="0"/>
-              <a:t>10/22/2017</a:t>
+              <a:t>11/12/2017</a:t>
             </a:fld>
             <a:endParaRPr lang="en-US"/>
           </a:p>
@@ -1810,7 +1819,7 @@
           <a:p>
             <a:fld id="{EDA0B0CA-96B7-4317-8230-3322BC274FA1}" type="datetimeFigureOut">
               <a:rPr lang="en-US" smtClean="0"/>
-              <a:t>10/22/2017</a:t>
+              <a:t>11/12/2017</a:t>
             </a:fld>
             <a:endParaRPr lang="en-US"/>
           </a:p>
@@ -1951,7 +1960,7 @@
           <a:p>
             <a:fld id="{EDA0B0CA-96B7-4317-8230-3322BC274FA1}" type="datetimeFigureOut">
               <a:rPr lang="en-US" smtClean="0"/>
-              <a:t>10/22/2017</a:t>
+              <a:t>11/12/2017</a:t>
             </a:fld>
             <a:endParaRPr lang="en-US"/>
           </a:p>
@@ -2064,7 +2073,7 @@
           <a:p>
             <a:fld id="{EDA0B0CA-96B7-4317-8230-3322BC274FA1}" type="datetimeFigureOut">
               <a:rPr lang="en-US" smtClean="0"/>
-              <a:t>10/22/2017</a:t>
+              <a:t>11/12/2017</a:t>
             </a:fld>
             <a:endParaRPr lang="en-US"/>
           </a:p>
@@ -2375,7 +2384,7 @@
           <a:p>
             <a:fld id="{EDA0B0CA-96B7-4317-8230-3322BC274FA1}" type="datetimeFigureOut">
               <a:rPr lang="en-US" smtClean="0"/>
-              <a:t>10/22/2017</a:t>
+              <a:t>11/12/2017</a:t>
             </a:fld>
             <a:endParaRPr lang="en-US"/>
           </a:p>
@@ -2663,7 +2672,7 @@
           <a:p>
             <a:fld id="{EDA0B0CA-96B7-4317-8230-3322BC274FA1}" type="datetimeFigureOut">
               <a:rPr lang="en-US" smtClean="0"/>
-              <a:t>10/22/2017</a:t>
+              <a:t>11/12/2017</a:t>
             </a:fld>
             <a:endParaRPr lang="en-US"/>
           </a:p>
@@ -2904,7 +2913,7 @@
           <a:p>
             <a:fld id="{EDA0B0CA-96B7-4317-8230-3322BC274FA1}" type="datetimeFigureOut">
               <a:rPr lang="en-US" smtClean="0"/>
-              <a:t>10/22/2017</a:t>
+              <a:t>11/12/2017</a:t>
             </a:fld>
             <a:endParaRPr lang="en-US"/>
           </a:p>
@@ -3335,16 +3344,16 @@
         </p:nvSpPr>
         <p:spPr>
           <a:xfrm>
-            <a:off x="357809" y="204821"/>
-            <a:ext cx="11476382" cy="6493268"/>
+            <a:off x="678241" y="204821"/>
+            <a:ext cx="9928846" cy="6493268"/>
           </a:xfrm>
           <a:prstGeom prst="roundRect">
             <a:avLst>
-              <a:gd name="adj" fmla="val 5413"/>
+              <a:gd name="adj" fmla="val 3367"/>
             </a:avLst>
           </a:prstGeom>
           <a:solidFill>
-            <a:schemeClr val="accent1">
+            <a:schemeClr val="accent5">
               <a:lumMod val="40000"/>
               <a:lumOff val="60000"/>
             </a:schemeClr>
@@ -3392,8 +3401,8 @@
         </p:nvSpPr>
         <p:spPr>
           <a:xfrm>
-            <a:off x="1057526" y="630095"/>
-            <a:ext cx="1279632" cy="317336"/>
+            <a:off x="1584913" y="579569"/>
+            <a:ext cx="1416196" cy="367862"/>
           </a:xfrm>
           <a:prstGeom prst="rect">
             <a:avLst/>
@@ -3424,14 +3433,14 @@
           <a:p>
             <a:pPr algn="ctr"/>
             <a:r>
-              <a:rPr lang="en-US" dirty="0"/>
+              <a:rPr lang="en-US" sz="2000" dirty="0"/>
               <a:t>:</a:t>
             </a:r>
             <a:r>
-              <a:rPr lang="en-US" sz="1400" dirty="0" err="1"/>
+              <a:rPr lang="en-US" sz="1600" dirty="0" err="1"/>
               <a:t>LogicManager</a:t>
             </a:r>
-            <a:endParaRPr lang="en-US" sz="1400" dirty="0"/>
+            <a:endParaRPr lang="en-US" sz="1600" dirty="0"/>
           </a:p>
         </p:txBody>
       </p:sp>
@@ -3449,7 +3458,7 @@
         </p:nvSpPr>
         <p:spPr>
           <a:xfrm>
-            <a:off x="6218087" y="1928959"/>
+            <a:off x="6819873" y="1928959"/>
             <a:ext cx="1409351" cy="479426"/>
           </a:xfrm>
           <a:prstGeom prst="rect">
@@ -3481,14 +3490,14 @@
           <a:p>
             <a:pPr algn="ctr"/>
             <a:r>
-              <a:rPr lang="en-US" sz="1400" dirty="0"/>
+              <a:rPr lang="en-US" sz="1600" dirty="0"/>
               <a:t>r:Retrieve</a:t>
             </a:r>
           </a:p>
           <a:p>
             <a:pPr algn="ctr"/>
             <a:r>
-              <a:rPr lang="en-US" sz="1400" dirty="0"/>
+              <a:rPr lang="en-US" sz="1600" dirty="0"/>
               <a:t>Command</a:t>
             </a:r>
           </a:p>
@@ -3508,8 +3517,8 @@
         </p:nvSpPr>
         <p:spPr>
           <a:xfrm>
-            <a:off x="3360803" y="480722"/>
-            <a:ext cx="1028320" cy="514146"/>
+            <a:off x="3808816" y="480722"/>
+            <a:ext cx="1294537" cy="514146"/>
           </a:xfrm>
           <a:prstGeom prst="rect">
             <a:avLst/>
@@ -3540,17 +3549,17 @@
           <a:p>
             <a:pPr algn="ctr"/>
             <a:r>
-              <a:rPr lang="en-US" sz="1400" dirty="0"/>
+              <a:rPr lang="en-US" sz="1600" dirty="0"/>
               <a:t>:Address</a:t>
             </a:r>
           </a:p>
           <a:p>
             <a:pPr algn="ctr"/>
             <a:r>
-              <a:rPr lang="en-US" sz="1400" dirty="0" err="1"/>
+              <a:rPr lang="en-US" sz="1600" dirty="0" err="1"/>
               <a:t>BookParser</a:t>
             </a:r>
-            <a:endParaRPr lang="en-US" sz="1400" dirty="0"/>
+            <a:endParaRPr lang="en-US" sz="1600" dirty="0"/>
           </a:p>
         </p:txBody>
       </p:sp>
@@ -3568,8 +3577,8 @@
         </p:nvSpPr>
         <p:spPr>
           <a:xfrm>
-            <a:off x="9746102" y="5056277"/>
-            <a:ext cx="1506996" cy="480952"/>
+            <a:off x="9621085" y="5326044"/>
+            <a:ext cx="1606548" cy="645679"/>
           </a:xfrm>
           <a:prstGeom prst="rect">
             <a:avLst/>
@@ -3600,15 +3609,15 @@
           <a:p>
             <a:pPr algn="ctr"/>
             <a:r>
-              <a:rPr lang="en-US" sz="1400" dirty="0" err="1"/>
+              <a:rPr lang="en-US" sz="1600" dirty="0" err="1"/>
               <a:t>result:Command</a:t>
             </a:r>
-            <a:endParaRPr lang="en-US" sz="1400" dirty="0"/>
+            <a:endParaRPr lang="en-US" sz="1600" dirty="0"/>
           </a:p>
           <a:p>
             <a:pPr algn="ctr"/>
             <a:r>
-              <a:rPr lang="en-US" sz="1400" dirty="0"/>
+              <a:rPr lang="en-US" sz="1600" dirty="0"/>
               <a:t>Result</a:t>
             </a:r>
           </a:p>
@@ -3628,8 +3637,8 @@
         </p:nvSpPr>
         <p:spPr>
           <a:xfrm>
-            <a:off x="4501568" y="1191524"/>
-            <a:ext cx="1386126" cy="494200"/>
+            <a:off x="5001182" y="1105942"/>
+            <a:ext cx="1554312" cy="618857"/>
           </a:xfrm>
           <a:prstGeom prst="rect">
             <a:avLst/>
@@ -3660,18 +3669,18 @@
           <a:p>
             <a:pPr algn="ctr"/>
             <a:r>
-              <a:rPr lang="en-US" sz="1400" dirty="0" err="1"/>
+              <a:rPr lang="en-US" sz="1600" dirty="0" err="1"/>
               <a:t>parser:Retrieve</a:t>
             </a:r>
-            <a:endParaRPr lang="en-US" sz="1400" dirty="0"/>
+            <a:endParaRPr lang="en-US" sz="1600" dirty="0"/>
           </a:p>
           <a:p>
             <a:pPr algn="ctr"/>
             <a:r>
-              <a:rPr lang="en-US" sz="1400" dirty="0" err="1"/>
+              <a:rPr lang="en-US" sz="1600" dirty="0" err="1"/>
               <a:t>CommandParser</a:t>
             </a:r>
-            <a:endParaRPr lang="en-US" sz="1400" dirty="0"/>
+            <a:endParaRPr lang="en-US" sz="1600" dirty="0"/>
           </a:p>
         </p:txBody>
       </p:sp>
@@ -3689,7 +3698,7 @@
         </p:nvSpPr>
         <p:spPr>
           <a:xfrm>
-            <a:off x="1635345" y="1389159"/>
+            <a:off x="2237131" y="1389159"/>
             <a:ext cx="151016" cy="5003690"/>
           </a:xfrm>
           <a:prstGeom prst="rect">
@@ -3738,7 +3747,7 @@
         </p:nvSpPr>
         <p:spPr>
           <a:xfrm>
-            <a:off x="3795835" y="1445162"/>
+            <a:off x="4397621" y="1445162"/>
             <a:ext cx="134367" cy="1864411"/>
           </a:xfrm>
           <a:prstGeom prst="rect">
@@ -3787,7 +3796,7 @@
         </p:nvSpPr>
         <p:spPr>
           <a:xfrm>
-            <a:off x="5086851" y="2244126"/>
+            <a:off x="5688637" y="2244126"/>
             <a:ext cx="154148" cy="704229"/>
           </a:xfrm>
           <a:prstGeom prst="rect">
@@ -3838,9 +3847,9 @@
           <p:nvPr/>
         </p:nvCxnSpPr>
         <p:spPr>
-          <a:xfrm flipV="1">
-            <a:off x="1697342" y="947431"/>
-            <a:ext cx="0" cy="450025"/>
+          <a:xfrm flipH="1" flipV="1">
+            <a:off x="2293011" y="947431"/>
+            <a:ext cx="6118" cy="450026"/>
           </a:xfrm>
           <a:prstGeom prst="line">
             <a:avLst/>
@@ -3849,10 +3858,10 @@
             <a:solidFill>
               <a:schemeClr val="accent1"/>
             </a:solidFill>
-            <a:prstDash val="dash"/>
+            <a:prstDash val="sysDash"/>
             <a:round/>
             <a:headEnd type="none" w="med" len="med"/>
-            <a:tailEnd type="none" w="med" len="med"/>
+            <a:tailEnd type="arrow" w="med" len="med"/>
           </a:ln>
         </p:spPr>
         <p:style>
@@ -3886,7 +3895,7 @@
         </p:nvCxnSpPr>
         <p:spPr>
           <a:xfrm>
-            <a:off x="1697342" y="6342024"/>
+            <a:off x="2299128" y="6342024"/>
             <a:ext cx="0" cy="227450"/>
           </a:xfrm>
           <a:prstGeom prst="line">
@@ -3896,7 +3905,7 @@
             <a:solidFill>
               <a:schemeClr val="accent1"/>
             </a:solidFill>
-            <a:prstDash val="dash"/>
+            <a:prstDash val="sysDash"/>
             <a:round/>
             <a:headEnd type="none" w="med" len="med"/>
             <a:tailEnd type="none" w="med" len="med"/>
@@ -3933,14 +3942,15 @@
         </p:nvCxnSpPr>
         <p:spPr>
           <a:xfrm>
-            <a:off x="1765151" y="1478707"/>
+            <a:off x="2366937" y="1478707"/>
             <a:ext cx="2030683" cy="0"/>
           </a:xfrm>
           <a:prstGeom prst="straightConnector1">
             <a:avLst/>
           </a:prstGeom>
           <a:ln w="25400">
-            <a:tailEnd type="triangle"/>
+            <a:headEnd type="none" w="med" len="med"/>
+            <a:tailEnd type="arrow" w="med" len="med"/>
           </a:ln>
         </p:spPr>
         <p:style>
@@ -3974,15 +3984,16 @@
         </p:nvCxnSpPr>
         <p:spPr>
           <a:xfrm flipH="1">
-            <a:off x="1764895" y="3284642"/>
+            <a:off x="2366681" y="3284642"/>
             <a:ext cx="2030682" cy="0"/>
           </a:xfrm>
           <a:prstGeom prst="straightConnector1">
             <a:avLst/>
           </a:prstGeom>
           <a:ln w="25400">
-            <a:prstDash val="dash"/>
-            <a:tailEnd type="triangle"/>
+            <a:prstDash val="sysDash"/>
+            <a:headEnd type="none" w="med" len="med"/>
+            <a:tailEnd type="arrow" w="med" len="med"/>
           </a:ln>
         </p:spPr>
         <p:style>
@@ -4002,10 +4013,10 @@
       </p:cxnSp>
       <p:sp>
         <p:nvSpPr>
-          <p:cNvPr id="35" name="Rectangle 34">
-            <a:extLst>
-              <a:ext uri="{FF2B5EF4-FFF2-40B4-BE49-F238E27FC236}">
-                <a16:creationId xmlns:a16="http://schemas.microsoft.com/office/drawing/2014/main" id="{70BBFC94-AB3C-4A61-ABF5-C4BE637D4D38}"/>
+          <p:cNvPr id="36" name="Rectangle 35">
+            <a:extLst>
+              <a:ext uri="{FF2B5EF4-FFF2-40B4-BE49-F238E27FC236}">
+                <a16:creationId xmlns:a16="http://schemas.microsoft.com/office/drawing/2014/main" id="{FC597156-F0EF-4122-93EC-F4418E788ABC}"/>
               </a:ext>
             </a:extLst>
           </p:cNvPr>
@@ -4014,8 +4025,8 @@
         </p:nvSpPr>
         <p:spPr>
           <a:xfrm>
-            <a:off x="6849556" y="3715327"/>
-            <a:ext cx="144511" cy="2583837"/>
+            <a:off x="7445491" y="2408258"/>
+            <a:ext cx="152077" cy="450774"/>
           </a:xfrm>
           <a:prstGeom prst="rect">
             <a:avLst/>
@@ -4049,12 +4060,53 @@
           </a:p>
         </p:txBody>
       </p:sp>
-      <p:sp>
-        <p:nvSpPr>
-          <p:cNvPr id="36" name="Rectangle 35">
-            <a:extLst>
-              <a:ext uri="{FF2B5EF4-FFF2-40B4-BE49-F238E27FC236}">
-                <a16:creationId xmlns:a16="http://schemas.microsoft.com/office/drawing/2014/main" id="{FC597156-F0EF-4122-93EC-F4418E788ABC}"/>
+      <p:cxnSp>
+        <p:nvCxnSpPr>
+          <p:cNvPr id="37" name="Straight Arrow Connector 36">
+            <a:extLst>
+              <a:ext uri="{FF2B5EF4-FFF2-40B4-BE49-F238E27FC236}">
+                <a16:creationId xmlns:a16="http://schemas.microsoft.com/office/drawing/2014/main" id="{A6F4AE1C-530C-41D9-B1EF-64E61480D604}"/>
+              </a:ext>
+            </a:extLst>
+          </p:cNvPr>
+          <p:cNvCxnSpPr>
+            <a:cxnSpLocks/>
+          </p:cNvCxnSpPr>
+          <p:nvPr/>
+        </p:nvCxnSpPr>
+        <p:spPr>
+          <a:xfrm flipV="1">
+            <a:off x="4533241" y="1543537"/>
+            <a:ext cx="467941" cy="1"/>
+          </a:xfrm>
+          <a:prstGeom prst="straightConnector1">
+            <a:avLst/>
+          </a:prstGeom>
+          <a:ln w="25400">
+            <a:tailEnd type="triangle"/>
+          </a:ln>
+        </p:spPr>
+        <p:style>
+          <a:lnRef idx="1">
+            <a:schemeClr val="accent1"/>
+          </a:lnRef>
+          <a:fillRef idx="0">
+            <a:schemeClr val="accent1"/>
+          </a:fillRef>
+          <a:effectRef idx="0">
+            <a:schemeClr val="accent1"/>
+          </a:effectRef>
+          <a:fontRef idx="minor">
+            <a:schemeClr val="tx1"/>
+          </a:fontRef>
+        </p:style>
+      </p:cxnSp>
+      <p:sp>
+        <p:nvSpPr>
+          <p:cNvPr id="41" name="Rectangle 40">
+            <a:extLst>
+              <a:ext uri="{FF2B5EF4-FFF2-40B4-BE49-F238E27FC236}">
+                <a16:creationId xmlns:a16="http://schemas.microsoft.com/office/drawing/2014/main" id="{39CCFD5B-58D3-49A3-816B-0463638BA19B}"/>
               </a:ext>
             </a:extLst>
           </p:cNvPr>
@@ -4063,8 +4115,8 @@
         </p:nvSpPr>
         <p:spPr>
           <a:xfrm>
-            <a:off x="6843705" y="2408258"/>
-            <a:ext cx="152077" cy="450774"/>
+            <a:off x="5693596" y="1683928"/>
+            <a:ext cx="154150" cy="206910"/>
           </a:xfrm>
           <a:prstGeom prst="rect">
             <a:avLst/>
@@ -4098,12 +4150,138 @@
           </a:p>
         </p:txBody>
       </p:sp>
+      <p:sp>
+        <p:nvSpPr>
+          <p:cNvPr id="44" name="TextBox 43">
+            <a:extLst>
+              <a:ext uri="{FF2B5EF4-FFF2-40B4-BE49-F238E27FC236}">
+                <a16:creationId xmlns:a16="http://schemas.microsoft.com/office/drawing/2014/main" id="{6212A462-83D4-42D9-8EFD-E6A5E289A361}"/>
+              </a:ext>
+            </a:extLst>
+          </p:cNvPr>
+          <p:cNvSpPr txBox="1"/>
+          <p:nvPr/>
+        </p:nvSpPr>
+        <p:spPr>
+          <a:xfrm>
+            <a:off x="2257765" y="1096009"/>
+            <a:ext cx="2285283" cy="307777"/>
+          </a:xfrm>
+          <a:prstGeom prst="rect">
+            <a:avLst/>
+          </a:prstGeom>
+          <a:noFill/>
+        </p:spPr>
+        <p:txBody>
+          <a:bodyPr wrap="square" rtlCol="0">
+            <a:spAutoFit/>
+          </a:bodyPr>
+          <a:lstStyle/>
+          <a:p>
+            <a:r>
+              <a:rPr lang="en-US" sz="1400" dirty="0" err="1">
+                <a:solidFill>
+                  <a:schemeClr val="accent1"/>
+                </a:solidFill>
+              </a:rPr>
+              <a:t>parseCommand</a:t>
+            </a:r>
+            <a:r>
+              <a:rPr lang="en-US" sz="1400" dirty="0">
+                <a:solidFill>
+                  <a:schemeClr val="accent1"/>
+                </a:solidFill>
+              </a:rPr>
+              <a:t>(“retrieve…”)</a:t>
+            </a:r>
+          </a:p>
+        </p:txBody>
+      </p:sp>
+      <p:sp>
+        <p:nvSpPr>
+          <p:cNvPr id="45" name="TextBox 44">
+            <a:extLst>
+              <a:ext uri="{FF2B5EF4-FFF2-40B4-BE49-F238E27FC236}">
+                <a16:creationId xmlns:a16="http://schemas.microsoft.com/office/drawing/2014/main" id="{812953EC-A44A-446A-B944-6D3E6520A38F}"/>
+              </a:ext>
+            </a:extLst>
+          </p:cNvPr>
+          <p:cNvSpPr txBox="1"/>
+          <p:nvPr/>
+        </p:nvSpPr>
+        <p:spPr>
+          <a:xfrm>
+            <a:off x="3297833" y="2969893"/>
+            <a:ext cx="359125" cy="369332"/>
+          </a:xfrm>
+          <a:prstGeom prst="rect">
+            <a:avLst/>
+          </a:prstGeom>
+          <a:noFill/>
+        </p:spPr>
+        <p:txBody>
+          <a:bodyPr wrap="square" rtlCol="0">
+            <a:spAutoFit/>
+          </a:bodyPr>
+          <a:lstStyle/>
+          <a:p>
+            <a:r>
+              <a:rPr lang="en-US" dirty="0">
+                <a:solidFill>
+                  <a:schemeClr val="accent1"/>
+                </a:solidFill>
+              </a:rPr>
+              <a:t>r</a:t>
+            </a:r>
+          </a:p>
+        </p:txBody>
+      </p:sp>
+      <p:sp>
+        <p:nvSpPr>
+          <p:cNvPr id="46" name="TextBox 45">
+            <a:extLst>
+              <a:ext uri="{FF2B5EF4-FFF2-40B4-BE49-F238E27FC236}">
+                <a16:creationId xmlns:a16="http://schemas.microsoft.com/office/drawing/2014/main" id="{8869C0D1-7AE2-4993-B8DC-FE504A0D46DB}"/>
+              </a:ext>
+            </a:extLst>
+          </p:cNvPr>
+          <p:cNvSpPr txBox="1"/>
+          <p:nvPr/>
+        </p:nvSpPr>
+        <p:spPr>
+          <a:xfrm>
+            <a:off x="4245363" y="3430622"/>
+            <a:ext cx="2166304" cy="338554"/>
+          </a:xfrm>
+          <a:prstGeom prst="rect">
+            <a:avLst/>
+          </a:prstGeom>
+          <a:noFill/>
+        </p:spPr>
+        <p:txBody>
+          <a:bodyPr wrap="square" rtlCol="0">
+            <a:spAutoFit/>
+          </a:bodyPr>
+          <a:lstStyle/>
+          <a:p>
+            <a:pPr algn="ctr"/>
+            <a:r>
+              <a:rPr lang="en-US" sz="1600" dirty="0">
+                <a:solidFill>
+                  <a:schemeClr val="accent1"/>
+                </a:solidFill>
+              </a:rPr>
+              <a:t>execute()</a:t>
+            </a:r>
+          </a:p>
+        </p:txBody>
+      </p:sp>
       <p:cxnSp>
         <p:nvCxnSpPr>
-          <p:cNvPr id="37" name="Straight Arrow Connector 36">
-            <a:extLst>
-              <a:ext uri="{FF2B5EF4-FFF2-40B4-BE49-F238E27FC236}">
-                <a16:creationId xmlns:a16="http://schemas.microsoft.com/office/drawing/2014/main" id="{A6F4AE1C-530C-41D9-B1EF-64E61480D604}"/>
+          <p:cNvPr id="51" name="Straight Arrow Connector 50">
+            <a:extLst>
+              <a:ext uri="{FF2B5EF4-FFF2-40B4-BE49-F238E27FC236}">
+                <a16:creationId xmlns:a16="http://schemas.microsoft.com/office/drawing/2014/main" id="{3B237392-05FB-4F07-8467-9AD65AE50D6B}"/>
               </a:ext>
             </a:extLst>
           </p:cNvPr>
@@ -4113,273 +4291,17 @@
           <p:nvPr/>
         </p:nvCxnSpPr>
         <p:spPr>
-          <a:xfrm flipV="1">
-            <a:off x="3931455" y="1543536"/>
-            <a:ext cx="570113" cy="1"/>
+          <a:xfrm flipH="1">
+            <a:off x="4528759" y="1857375"/>
+            <a:ext cx="1142731" cy="0"/>
           </a:xfrm>
           <a:prstGeom prst="straightConnector1">
             <a:avLst/>
           </a:prstGeom>
           <a:ln w="25400">
-            <a:tailEnd type="triangle"/>
-          </a:ln>
-        </p:spPr>
-        <p:style>
-          <a:lnRef idx="1">
-            <a:schemeClr val="accent1"/>
-          </a:lnRef>
-          <a:fillRef idx="0">
-            <a:schemeClr val="accent1"/>
-          </a:fillRef>
-          <a:effectRef idx="0">
-            <a:schemeClr val="accent1"/>
-          </a:effectRef>
-          <a:fontRef idx="minor">
-            <a:schemeClr val="tx1"/>
-          </a:fontRef>
-        </p:style>
-      </p:cxnSp>
-      <p:cxnSp>
-        <p:nvCxnSpPr>
-          <p:cNvPr id="39" name="Straight Arrow Connector 38">
-            <a:extLst>
-              <a:ext uri="{FF2B5EF4-FFF2-40B4-BE49-F238E27FC236}">
-                <a16:creationId xmlns:a16="http://schemas.microsoft.com/office/drawing/2014/main" id="{7CC065F2-0A41-4047-ACC1-9B88283F15DE}"/>
-              </a:ext>
-            </a:extLst>
-          </p:cNvPr>
-          <p:cNvCxnSpPr>
-            <a:cxnSpLocks/>
-          </p:cNvCxnSpPr>
-          <p:nvPr/>
-        </p:nvCxnSpPr>
-        <p:spPr>
-          <a:xfrm>
-            <a:off x="5241000" y="2314298"/>
-            <a:ext cx="977086" cy="0"/>
-          </a:xfrm>
-          <a:prstGeom prst="straightConnector1">
-            <a:avLst/>
-          </a:prstGeom>
-          <a:ln w="25400">
-            <a:tailEnd type="triangle"/>
-          </a:ln>
-        </p:spPr>
-        <p:style>
-          <a:lnRef idx="1">
-            <a:schemeClr val="accent1"/>
-          </a:lnRef>
-          <a:fillRef idx="0">
-            <a:schemeClr val="accent1"/>
-          </a:fillRef>
-          <a:effectRef idx="0">
-            <a:schemeClr val="accent1"/>
-          </a:effectRef>
-          <a:fontRef idx="minor">
-            <a:schemeClr val="tx1"/>
-          </a:fontRef>
-        </p:style>
-      </p:cxnSp>
-      <p:sp>
-        <p:nvSpPr>
-          <p:cNvPr id="41" name="Rectangle 40">
-            <a:extLst>
-              <a:ext uri="{FF2B5EF4-FFF2-40B4-BE49-F238E27FC236}">
-                <a16:creationId xmlns:a16="http://schemas.microsoft.com/office/drawing/2014/main" id="{39CCFD5B-58D3-49A3-816B-0463638BA19B}"/>
-              </a:ext>
-            </a:extLst>
-          </p:cNvPr>
-          <p:cNvSpPr/>
-          <p:nvPr/>
-        </p:nvSpPr>
-        <p:spPr>
-          <a:xfrm>
-            <a:off x="5091810" y="1683928"/>
-            <a:ext cx="154150" cy="206910"/>
-          </a:xfrm>
-          <a:prstGeom prst="rect">
-            <a:avLst/>
-          </a:prstGeom>
-          <a:ln>
-            <a:noFill/>
-          </a:ln>
-        </p:spPr>
-        <p:style>
-          <a:lnRef idx="2">
-            <a:schemeClr val="accent1">
-              <a:shade val="50000"/>
-            </a:schemeClr>
-          </a:lnRef>
-          <a:fillRef idx="1">
-            <a:schemeClr val="accent1"/>
-          </a:fillRef>
-          <a:effectRef idx="0">
-            <a:schemeClr val="accent1"/>
-          </a:effectRef>
-          <a:fontRef idx="minor">
-            <a:schemeClr val="lt1"/>
-          </a:fontRef>
-        </p:style>
-        <p:txBody>
-          <a:bodyPr rtlCol="0" anchor="ctr"/>
-          <a:lstStyle/>
-          <a:p>
-            <a:pPr algn="ctr"/>
-            <a:endParaRPr lang="en-US" dirty="0"/>
-          </a:p>
-        </p:txBody>
-      </p:sp>
-      <p:sp>
-        <p:nvSpPr>
-          <p:cNvPr id="44" name="TextBox 43">
-            <a:extLst>
-              <a:ext uri="{FF2B5EF4-FFF2-40B4-BE49-F238E27FC236}">
-                <a16:creationId xmlns:a16="http://schemas.microsoft.com/office/drawing/2014/main" id="{6212A462-83D4-42D9-8EFD-E6A5E289A361}"/>
-              </a:ext>
-            </a:extLst>
-          </p:cNvPr>
-          <p:cNvSpPr txBox="1"/>
-          <p:nvPr/>
-        </p:nvSpPr>
-        <p:spPr>
-          <a:xfrm>
-            <a:off x="1776273" y="1191524"/>
-            <a:ext cx="2106223" cy="276999"/>
-          </a:xfrm>
-          <a:prstGeom prst="rect">
-            <a:avLst/>
-          </a:prstGeom>
-          <a:noFill/>
-        </p:spPr>
-        <p:txBody>
-          <a:bodyPr wrap="square" rtlCol="0">
-            <a:spAutoFit/>
-          </a:bodyPr>
-          <a:lstStyle/>
-          <a:p>
-            <a:r>
-              <a:rPr lang="en-US" sz="1200" dirty="0" err="1">
-                <a:solidFill>
-                  <a:schemeClr val="accent1"/>
-                </a:solidFill>
-              </a:rPr>
-              <a:t>parseCommand</a:t>
-            </a:r>
-            <a:r>
-              <a:rPr lang="en-US" sz="1200" dirty="0">
-                <a:solidFill>
-                  <a:schemeClr val="accent1"/>
-                </a:solidFill>
-              </a:rPr>
-              <a:t>(“retrieve tag”)</a:t>
-            </a:r>
-          </a:p>
-        </p:txBody>
-      </p:sp>
-      <p:sp>
-        <p:nvSpPr>
-          <p:cNvPr id="45" name="TextBox 44">
-            <a:extLst>
-              <a:ext uri="{FF2B5EF4-FFF2-40B4-BE49-F238E27FC236}">
-                <a16:creationId xmlns:a16="http://schemas.microsoft.com/office/drawing/2014/main" id="{812953EC-A44A-446A-B944-6D3E6520A38F}"/>
-              </a:ext>
-            </a:extLst>
-          </p:cNvPr>
-          <p:cNvSpPr txBox="1"/>
-          <p:nvPr/>
-        </p:nvSpPr>
-        <p:spPr>
-          <a:xfrm>
-            <a:off x="2696047" y="2969893"/>
-            <a:ext cx="359125" cy="338554"/>
-          </a:xfrm>
-          <a:prstGeom prst="rect">
-            <a:avLst/>
-          </a:prstGeom>
-          <a:noFill/>
-        </p:spPr>
-        <p:txBody>
-          <a:bodyPr wrap="square" rtlCol="0">
-            <a:spAutoFit/>
-          </a:bodyPr>
-          <a:lstStyle/>
-          <a:p>
-            <a:r>
-              <a:rPr lang="en-US" sz="1600" dirty="0">
-                <a:solidFill>
-                  <a:schemeClr val="accent1"/>
-                </a:solidFill>
-              </a:rPr>
-              <a:t>r</a:t>
-            </a:r>
-          </a:p>
-        </p:txBody>
-      </p:sp>
-      <p:sp>
-        <p:nvSpPr>
-          <p:cNvPr id="46" name="TextBox 45">
-            <a:extLst>
-              <a:ext uri="{FF2B5EF4-FFF2-40B4-BE49-F238E27FC236}">
-                <a16:creationId xmlns:a16="http://schemas.microsoft.com/office/drawing/2014/main" id="{8869C0D1-7AE2-4993-B8DC-FE504A0D46DB}"/>
-              </a:ext>
-            </a:extLst>
-          </p:cNvPr>
-          <p:cNvSpPr txBox="1"/>
-          <p:nvPr/>
-        </p:nvSpPr>
-        <p:spPr>
-          <a:xfrm>
-            <a:off x="3643577" y="3430622"/>
-            <a:ext cx="2166304" cy="307777"/>
-          </a:xfrm>
-          <a:prstGeom prst="rect">
-            <a:avLst/>
-          </a:prstGeom>
-          <a:noFill/>
-        </p:spPr>
-        <p:txBody>
-          <a:bodyPr wrap="square" rtlCol="0">
-            <a:spAutoFit/>
-          </a:bodyPr>
-          <a:lstStyle/>
-          <a:p>
-            <a:pPr algn="ctr"/>
-            <a:r>
-              <a:rPr lang="en-US" sz="1400" dirty="0">
-                <a:solidFill>
-                  <a:schemeClr val="accent1"/>
-                </a:solidFill>
-              </a:rPr>
-              <a:t>execute()</a:t>
-            </a:r>
-          </a:p>
-        </p:txBody>
-      </p:sp>
-      <p:cxnSp>
-        <p:nvCxnSpPr>
-          <p:cNvPr id="51" name="Straight Arrow Connector 50">
-            <a:extLst>
-              <a:ext uri="{FF2B5EF4-FFF2-40B4-BE49-F238E27FC236}">
-                <a16:creationId xmlns:a16="http://schemas.microsoft.com/office/drawing/2014/main" id="{3B237392-05FB-4F07-8467-9AD65AE50D6B}"/>
-              </a:ext>
-            </a:extLst>
-          </p:cNvPr>
-          <p:cNvCxnSpPr>
-            <a:cxnSpLocks/>
-          </p:cNvCxnSpPr>
-          <p:nvPr/>
-        </p:nvCxnSpPr>
-        <p:spPr>
-          <a:xfrm flipH="1">
-            <a:off x="3926973" y="1857375"/>
-            <a:ext cx="1142731" cy="0"/>
-          </a:xfrm>
-          <a:prstGeom prst="straightConnector1">
-            <a:avLst/>
-          </a:prstGeom>
-          <a:ln w="25400">
-            <a:prstDash val="dash"/>
-            <a:tailEnd type="triangle"/>
+            <a:prstDash val="sysDash"/>
+            <a:headEnd type="none" w="med" len="med"/>
+            <a:tailEnd type="arrow" w="med" len="med"/>
           </a:ln>
         </p:spPr>
         <p:style>
@@ -4413,14 +4335,15 @@
         </p:nvCxnSpPr>
         <p:spPr>
           <a:xfrm>
-            <a:off x="3926973" y="2275273"/>
+            <a:off x="4528759" y="2275273"/>
             <a:ext cx="1154458" cy="0"/>
           </a:xfrm>
           <a:prstGeom prst="straightConnector1">
             <a:avLst/>
           </a:prstGeom>
           <a:ln w="25400">
-            <a:tailEnd type="triangle"/>
+            <a:headEnd type="none" w="med" len="med"/>
+            <a:tailEnd type="arrow" w="med" len="med"/>
           </a:ln>
         </p:spPr>
         <p:style>
@@ -4454,15 +4377,16 @@
         </p:nvCxnSpPr>
         <p:spPr>
           <a:xfrm flipH="1">
-            <a:off x="5241001" y="2840681"/>
+            <a:off x="5842787" y="2840681"/>
             <a:ext cx="1602704" cy="0"/>
           </a:xfrm>
           <a:prstGeom prst="straightConnector1">
             <a:avLst/>
           </a:prstGeom>
           <a:ln w="25400">
-            <a:prstDash val="dash"/>
-            <a:tailEnd type="triangle"/>
+            <a:prstDash val="sysDash"/>
+            <a:headEnd type="none" w="med" len="med"/>
+            <a:tailEnd type="arrow" w="med" len="med"/>
           </a:ln>
         </p:spPr>
         <p:style>
@@ -4496,15 +4420,16 @@
         </p:nvCxnSpPr>
         <p:spPr>
           <a:xfrm flipH="1">
-            <a:off x="3938153" y="2931730"/>
+            <a:off x="4539939" y="2931730"/>
             <a:ext cx="1142732" cy="0"/>
           </a:xfrm>
           <a:prstGeom prst="straightConnector1">
             <a:avLst/>
           </a:prstGeom>
           <a:ln w="25400">
-            <a:prstDash val="dash"/>
-            <a:tailEnd type="triangle"/>
+            <a:prstDash val="sysDash"/>
+            <a:headEnd type="none" w="med" len="med"/>
+            <a:tailEnd type="arrow" w="med" len="med"/>
           </a:ln>
         </p:spPr>
         <p:style>
@@ -4538,15 +4463,16 @@
         </p:nvCxnSpPr>
         <p:spPr>
           <a:xfrm flipH="1" flipV="1">
-            <a:off x="1764898" y="6270465"/>
+            <a:off x="2366684" y="6270465"/>
             <a:ext cx="5078807" cy="7966"/>
           </a:xfrm>
           <a:prstGeom prst="straightConnector1">
             <a:avLst/>
           </a:prstGeom>
           <a:ln w="25400">
-            <a:prstDash val="dash"/>
-            <a:tailEnd type="triangle"/>
+            <a:prstDash val="sysDash"/>
+            <a:headEnd type="none" w="med" len="med"/>
+            <a:tailEnd type="arrow" w="med" len="med"/>
           </a:ln>
         </p:spPr>
         <p:style>
@@ -4578,8 +4504,8 @@
         </p:nvSpPr>
         <p:spPr>
           <a:xfrm>
-            <a:off x="3415186" y="5963861"/>
-            <a:ext cx="2166304" cy="307777"/>
+            <a:off x="4016972" y="5963861"/>
+            <a:ext cx="2166304" cy="338554"/>
           </a:xfrm>
           <a:prstGeom prst="rect">
             <a:avLst/>
@@ -4594,7 +4520,7 @@
           <a:p>
             <a:pPr algn="ctr"/>
             <a:r>
-              <a:rPr lang="en-US" sz="1400" dirty="0">
+              <a:rPr lang="en-US" sz="1600" dirty="0">
                 <a:solidFill>
                   <a:schemeClr val="accent1"/>
                 </a:solidFill>
@@ -4618,8 +4544,8 @@
         </p:nvSpPr>
         <p:spPr>
           <a:xfrm>
-            <a:off x="4120191" y="1981715"/>
-            <a:ext cx="842342" cy="307777"/>
+            <a:off x="4721977" y="1981715"/>
+            <a:ext cx="842342" cy="338554"/>
           </a:xfrm>
           <a:prstGeom prst="rect">
             <a:avLst/>
@@ -4634,7 +4560,7 @@
           <a:p>
             <a:pPr algn="ctr"/>
             <a:r>
-              <a:rPr lang="en-US" sz="1400" dirty="0">
+              <a:rPr lang="en-US" sz="1600" dirty="0">
                 <a:solidFill>
                   <a:schemeClr val="accent1"/>
                 </a:solidFill>
@@ -4660,15 +4586,16 @@
         </p:nvCxnSpPr>
         <p:spPr>
           <a:xfrm flipH="1">
-            <a:off x="476678" y="6374974"/>
-            <a:ext cx="1152852" cy="0"/>
+            <a:off x="289174" y="6374974"/>
+            <a:ext cx="1942143" cy="0"/>
           </a:xfrm>
           <a:prstGeom prst="straightConnector1">
             <a:avLst/>
           </a:prstGeom>
           <a:ln w="25400">
-            <a:prstDash val="dash"/>
-            <a:tailEnd type="triangle"/>
+            <a:prstDash val="sysDash"/>
+            <a:headEnd type="none" w="med" len="med"/>
+            <a:tailEnd type="arrow" w="med" len="med"/>
           </a:ln>
         </p:spPr>
         <p:style>
@@ -4700,8 +4627,8 @@
         </p:nvSpPr>
         <p:spPr>
           <a:xfrm>
-            <a:off x="696014" y="6075178"/>
-            <a:ext cx="740405" cy="307777"/>
+            <a:off x="1078974" y="6075178"/>
+            <a:ext cx="740405" cy="338554"/>
           </a:xfrm>
           <a:prstGeom prst="rect">
             <a:avLst/>
@@ -4716,7 +4643,7 @@
           <a:p>
             <a:pPr algn="ctr"/>
             <a:r>
-              <a:rPr lang="en-US" sz="1400" dirty="0">
+              <a:rPr lang="en-US" sz="1600" dirty="0">
                 <a:solidFill>
                   <a:schemeClr val="accent1"/>
                 </a:solidFill>
@@ -4742,14 +4669,18 @@
         </p:nvCxnSpPr>
         <p:spPr>
           <a:xfrm>
-            <a:off x="71562" y="1397456"/>
-            <a:ext cx="1558908" cy="0"/>
+            <a:off x="406401" y="1397456"/>
+            <a:ext cx="1825855" cy="0"/>
           </a:xfrm>
           <a:prstGeom prst="straightConnector1">
             <a:avLst/>
           </a:prstGeom>
           <a:ln w="25400">
-            <a:tailEnd type="triangle"/>
+            <a:solidFill>
+              <a:srgbClr val="00B050"/>
+            </a:solidFill>
+            <a:headEnd type="none" w="med" len="med"/>
+            <a:tailEnd type="arrow" w="med" len="med"/>
           </a:ln>
         </p:spPr>
         <p:style>
@@ -4781,13 +4712,18 @@
         </p:nvSpPr>
         <p:spPr>
           <a:xfrm>
-            <a:off x="-5873" y="1087281"/>
-            <a:ext cx="1603644" cy="276999"/>
+            <a:off x="125049" y="1081517"/>
+            <a:ext cx="2197864" cy="307777"/>
           </a:xfrm>
           <a:prstGeom prst="rect">
             <a:avLst/>
           </a:prstGeom>
           <a:noFill/>
+          <a:ln>
+            <a:noFill/>
+            <a:headEnd type="none" w="med" len="med"/>
+            <a:tailEnd type="none" w="med" len="med"/>
+          </a:ln>
         </p:spPr>
         <p:txBody>
           <a:bodyPr wrap="square" rtlCol="0">
@@ -4796,12 +4732,12 @@
           <a:lstStyle/>
           <a:p>
             <a:r>
-              <a:rPr lang="en-US" sz="1200" dirty="0">
+              <a:rPr lang="en-US" sz="1400" dirty="0">
                 <a:solidFill>
                   <a:schemeClr val="accent1"/>
                 </a:solidFill>
               </a:rPr>
-              <a:t>execute(“retrieve tag”)</a:t>
+              <a:t>execute(“retrieve friends”)</a:t>
             </a:r>
           </a:p>
         </p:txBody>
@@ -4820,8 +4756,8 @@
         </p:nvSpPr>
         <p:spPr>
           <a:xfrm>
-            <a:off x="4399396" y="2617236"/>
-            <a:ext cx="359125" cy="338554"/>
+            <a:off x="5001182" y="2617236"/>
+            <a:ext cx="359125" cy="369332"/>
           </a:xfrm>
           <a:prstGeom prst="rect">
             <a:avLst/>
@@ -4835,7 +4771,7 @@
           <a:lstStyle/>
           <a:p>
             <a:r>
-              <a:rPr lang="en-US" sz="1600" dirty="0">
+              <a:rPr lang="en-US" dirty="0">
                 <a:solidFill>
                   <a:schemeClr val="accent1"/>
                 </a:solidFill>
@@ -4859,7 +4795,7 @@
         </p:nvSpPr>
         <p:spPr>
           <a:xfrm>
-            <a:off x="10452782" y="5515491"/>
+            <a:off x="10451780" y="5971723"/>
             <a:ext cx="154150" cy="206910"/>
           </a:xfrm>
           <a:prstGeom prst="rect">
@@ -4910,15 +4846,16 @@
         </p:nvCxnSpPr>
         <p:spPr>
           <a:xfrm flipH="1">
-            <a:off x="7005798" y="5709962"/>
-            <a:ext cx="3446984" cy="0"/>
+            <a:off x="7595855" y="6160050"/>
+            <a:ext cx="2855925" cy="0"/>
           </a:xfrm>
           <a:prstGeom prst="straightConnector1">
             <a:avLst/>
           </a:prstGeom>
           <a:ln w="25400">
-            <a:prstDash val="dash"/>
-            <a:tailEnd type="triangle"/>
+            <a:prstDash val="sysDash"/>
+            <a:headEnd type="none" w="med" len="med"/>
+            <a:tailEnd type="arrow" w="med" len="med"/>
           </a:ln>
         </p:spPr>
         <p:style>
@@ -4936,58 +4873,6 @@
           </a:fontRef>
         </p:style>
       </p:cxnSp>
-      <p:sp>
-        <p:nvSpPr>
-          <p:cNvPr id="75" name="Rectangle 74">
-            <a:extLst>
-              <a:ext uri="{FF2B5EF4-FFF2-40B4-BE49-F238E27FC236}">
-                <a16:creationId xmlns:a16="http://schemas.microsoft.com/office/drawing/2014/main" id="{E4C45D89-8F6E-4613-A6DA-925CFF9BB553}"/>
-              </a:ext>
-            </a:extLst>
-          </p:cNvPr>
-          <p:cNvSpPr/>
-          <p:nvPr/>
-        </p:nvSpPr>
-        <p:spPr>
-          <a:xfrm>
-            <a:off x="8152020" y="3271772"/>
-            <a:ext cx="721304" cy="289736"/>
-          </a:xfrm>
-          <a:prstGeom prst="rect">
-            <a:avLst/>
-          </a:prstGeom>
-          <a:ln>
-            <a:noFill/>
-          </a:ln>
-        </p:spPr>
-        <p:style>
-          <a:lnRef idx="2">
-            <a:schemeClr val="accent1">
-              <a:shade val="50000"/>
-            </a:schemeClr>
-          </a:lnRef>
-          <a:fillRef idx="1">
-            <a:schemeClr val="accent1"/>
-          </a:fillRef>
-          <a:effectRef idx="0">
-            <a:schemeClr val="accent1"/>
-          </a:effectRef>
-          <a:fontRef idx="minor">
-            <a:schemeClr val="lt1"/>
-          </a:fontRef>
-        </p:style>
-        <p:txBody>
-          <a:bodyPr rtlCol="0" anchor="ctr"/>
-          <a:lstStyle/>
-          <a:p>
-            <a:pPr algn="ctr"/>
-            <a:r>
-              <a:rPr lang="en-US" sz="1400" dirty="0"/>
-              <a:t>:Model</a:t>
-            </a:r>
-          </a:p>
-        </p:txBody>
-      </p:sp>
       <p:cxnSp>
         <p:nvCxnSpPr>
           <p:cNvPr id="77" name="Straight Arrow Connector 76">
@@ -5004,14 +4889,15 @@
         </p:nvCxnSpPr>
         <p:spPr>
           <a:xfrm>
-            <a:off x="6976320" y="5354238"/>
-            <a:ext cx="2764028" cy="0"/>
+            <a:off x="7595853" y="5815332"/>
+            <a:ext cx="2025232" cy="0"/>
           </a:xfrm>
           <a:prstGeom prst="straightConnector1">
             <a:avLst/>
           </a:prstGeom>
           <a:ln w="25400">
-            <a:tailEnd type="triangle"/>
+            <a:headEnd type="none" w="med" len="med"/>
+            <a:tailEnd type="arrow" w="med" len="med"/>
           </a:ln>
         </p:spPr>
         <p:style>
@@ -5045,14 +4931,15 @@
         </p:nvCxnSpPr>
         <p:spPr>
           <a:xfrm>
-            <a:off x="1764753" y="3719135"/>
+            <a:off x="2366539" y="3719135"/>
             <a:ext cx="5078811" cy="0"/>
           </a:xfrm>
           <a:prstGeom prst="straightConnector1">
             <a:avLst/>
           </a:prstGeom>
           <a:ln w="25400">
-            <a:tailEnd type="triangle"/>
+            <a:headEnd type="none" w="med" len="med"/>
+            <a:tailEnd type="arrow" w="med" len="med"/>
           </a:ln>
         </p:spPr>
         <p:style>
@@ -5070,61 +4957,12 @@
           </a:fontRef>
         </p:style>
       </p:cxnSp>
-      <p:sp>
-        <p:nvSpPr>
-          <p:cNvPr id="119" name="Rectangle 118">
-            <a:extLst>
-              <a:ext uri="{FF2B5EF4-FFF2-40B4-BE49-F238E27FC236}">
-                <a16:creationId xmlns:a16="http://schemas.microsoft.com/office/drawing/2014/main" id="{FBC6C0ED-3FCB-454B-B6B1-35E28BA98103}"/>
-              </a:ext>
-            </a:extLst>
-          </p:cNvPr>
-          <p:cNvSpPr/>
-          <p:nvPr/>
-        </p:nvSpPr>
-        <p:spPr>
-          <a:xfrm>
-            <a:off x="8448734" y="3963207"/>
-            <a:ext cx="162530" cy="783630"/>
-          </a:xfrm>
-          <a:prstGeom prst="rect">
-            <a:avLst/>
-          </a:prstGeom>
-          <a:ln>
-            <a:noFill/>
-          </a:ln>
-        </p:spPr>
-        <p:style>
-          <a:lnRef idx="2">
-            <a:schemeClr val="accent1">
-              <a:shade val="50000"/>
-            </a:schemeClr>
-          </a:lnRef>
-          <a:fillRef idx="1">
-            <a:schemeClr val="accent1"/>
-          </a:fillRef>
-          <a:effectRef idx="0">
-            <a:schemeClr val="accent1"/>
-          </a:effectRef>
-          <a:fontRef idx="minor">
-            <a:schemeClr val="lt1"/>
-          </a:fontRef>
-        </p:style>
-        <p:txBody>
-          <a:bodyPr rtlCol="0" anchor="ctr"/>
-          <a:lstStyle/>
-          <a:p>
-            <a:pPr algn="ctr"/>
-            <a:endParaRPr lang="en-US" dirty="0"/>
-          </a:p>
-        </p:txBody>
-      </p:sp>
       <p:cxnSp>
         <p:nvCxnSpPr>
-          <p:cNvPr id="120" name="Straight Arrow Connector 119">
-            <a:extLst>
-              <a:ext uri="{FF2B5EF4-FFF2-40B4-BE49-F238E27FC236}">
-                <a16:creationId xmlns:a16="http://schemas.microsoft.com/office/drawing/2014/main" id="{2D1FCE9E-57FC-4637-A36F-ACBFD9F3B778}"/>
+          <p:cNvPr id="154" name="Straight Connector 153">
+            <a:extLst>
+              <a:ext uri="{FF2B5EF4-FFF2-40B4-BE49-F238E27FC236}">
+                <a16:creationId xmlns:a16="http://schemas.microsoft.com/office/drawing/2014/main" id="{6AE9B5A6-8B3B-4D13-9528-E620503266EF}"/>
               </a:ext>
             </a:extLst>
           </p:cNvPr>
@@ -5134,129 +4972,8 @@
           <p:nvPr/>
         </p:nvCxnSpPr>
         <p:spPr>
-          <a:xfrm>
-            <a:off x="7001819" y="3999721"/>
-            <a:ext cx="1446915" cy="0"/>
-          </a:xfrm>
-          <a:prstGeom prst="straightConnector1">
-            <a:avLst/>
-          </a:prstGeom>
-          <a:ln w="25400">
-            <a:tailEnd type="triangle"/>
-          </a:ln>
-        </p:spPr>
-        <p:style>
-          <a:lnRef idx="1">
-            <a:schemeClr val="accent1"/>
-          </a:lnRef>
-          <a:fillRef idx="0">
-            <a:schemeClr val="accent1"/>
-          </a:fillRef>
-          <a:effectRef idx="0">
-            <a:schemeClr val="accent1"/>
-          </a:effectRef>
-          <a:fontRef idx="minor">
-            <a:schemeClr val="tx1"/>
-          </a:fontRef>
-        </p:style>
-      </p:cxnSp>
-      <p:sp>
-        <p:nvSpPr>
-          <p:cNvPr id="122" name="TextBox 121">
-            <a:extLst>
-              <a:ext uri="{FF2B5EF4-FFF2-40B4-BE49-F238E27FC236}">
-                <a16:creationId xmlns:a16="http://schemas.microsoft.com/office/drawing/2014/main" id="{452E36D0-FC17-409D-9ADC-E7B70D4135B9}"/>
-              </a:ext>
-            </a:extLst>
-          </p:cNvPr>
-          <p:cNvSpPr txBox="1"/>
-          <p:nvPr/>
-        </p:nvSpPr>
-        <p:spPr>
-          <a:xfrm>
-            <a:off x="7032446" y="3571208"/>
-            <a:ext cx="1481406" cy="469359"/>
-          </a:xfrm>
-          <a:prstGeom prst="rect">
-            <a:avLst/>
-          </a:prstGeom>
-          <a:noFill/>
-        </p:spPr>
-        <p:txBody>
-          <a:bodyPr wrap="square" rtlCol="0">
-            <a:spAutoFit/>
-          </a:bodyPr>
-          <a:lstStyle/>
-          <a:p>
-            <a:pPr algn="ctr"/>
-            <a:r>
-              <a:rPr lang="en-US" sz="1050" dirty="0" err="1">
-                <a:solidFill>
-                  <a:schemeClr val="accent1"/>
-                </a:solidFill>
-              </a:rPr>
-              <a:t>updateFilteredPerson</a:t>
-            </a:r>
-            <a:endParaRPr lang="en-US" sz="1050" dirty="0">
-              <a:solidFill>
-                <a:schemeClr val="accent1"/>
-              </a:solidFill>
-            </a:endParaRPr>
-          </a:p>
-          <a:p>
-            <a:pPr algn="ctr"/>
-            <a:r>
-              <a:rPr lang="en-US" sz="1050" dirty="0">
-                <a:solidFill>
-                  <a:schemeClr val="accent1"/>
-                </a:solidFill>
-              </a:rPr>
-              <a:t>List</a:t>
-            </a:r>
-            <a:r>
-              <a:rPr lang="en-US" sz="1400" dirty="0">
-                <a:solidFill>
-                  <a:schemeClr val="accent1"/>
-                </a:solidFill>
-              </a:rPr>
-              <a:t>(</a:t>
-            </a:r>
-            <a:r>
-              <a:rPr lang="en-US" sz="1050" dirty="0">
-                <a:solidFill>
-                  <a:schemeClr val="accent1"/>
-                </a:solidFill>
-              </a:rPr>
-              <a:t>predicate</a:t>
-            </a:r>
-            <a:r>
-              <a:rPr lang="en-US" sz="1400" dirty="0">
-                <a:solidFill>
-                  <a:schemeClr val="accent1"/>
-                </a:solidFill>
-              </a:rPr>
-              <a:t>)</a:t>
-            </a:r>
-          </a:p>
-        </p:txBody>
-      </p:sp>
-      <p:cxnSp>
-        <p:nvCxnSpPr>
-          <p:cNvPr id="154" name="Straight Connector 153">
-            <a:extLst>
-              <a:ext uri="{FF2B5EF4-FFF2-40B4-BE49-F238E27FC236}">
-                <a16:creationId xmlns:a16="http://schemas.microsoft.com/office/drawing/2014/main" id="{6AE9B5A6-8B3B-4D13-9528-E620503266EF}"/>
-              </a:ext>
-            </a:extLst>
-          </p:cNvPr>
-          <p:cNvCxnSpPr>
-            <a:cxnSpLocks/>
-          </p:cNvCxnSpPr>
-          <p:nvPr/>
-        </p:nvCxnSpPr>
-        <p:spPr>
           <a:xfrm flipV="1">
-            <a:off x="3857770" y="985988"/>
+            <a:off x="4459556" y="985988"/>
             <a:ext cx="0" cy="484768"/>
           </a:xfrm>
           <a:prstGeom prst="line">
@@ -5266,7 +4983,7 @@
             <a:solidFill>
               <a:schemeClr val="accent1"/>
             </a:solidFill>
-            <a:prstDash val="dash"/>
+            <a:prstDash val="sysDash"/>
             <a:round/>
             <a:headEnd type="none" w="med" len="med"/>
             <a:tailEnd type="none" w="med" len="med"/>
@@ -5303,7 +5020,7 @@
         </p:nvCxnSpPr>
         <p:spPr>
           <a:xfrm flipV="1">
-            <a:off x="3857770" y="3249683"/>
+            <a:off x="4459556" y="3249683"/>
             <a:ext cx="0" cy="328457"/>
           </a:xfrm>
           <a:prstGeom prst="line">
@@ -5313,7 +5030,7 @@
             <a:solidFill>
               <a:schemeClr val="accent1"/>
             </a:solidFill>
-            <a:prstDash val="dash"/>
+            <a:prstDash val="sysDash"/>
             <a:round/>
             <a:headEnd type="none" w="med" len="med"/>
             <a:tailEnd type="none" w="med" len="med"/>
@@ -5350,7 +5067,7 @@
         </p:nvCxnSpPr>
         <p:spPr>
           <a:xfrm flipV="1">
-            <a:off x="5159424" y="2948356"/>
+            <a:off x="5761210" y="2948356"/>
             <a:ext cx="0" cy="391815"/>
           </a:xfrm>
           <a:prstGeom prst="line">
@@ -5360,7 +5077,7 @@
             <a:solidFill>
               <a:schemeClr val="accent1"/>
             </a:solidFill>
-            <a:prstDash val="dash"/>
+            <a:prstDash val="sysDash"/>
             <a:round/>
             <a:headEnd type="none" w="med" len="med"/>
             <a:tailEnd type="none" w="med" len="med"/>
@@ -5397,7 +5114,7 @@
         </p:nvCxnSpPr>
         <p:spPr>
           <a:xfrm flipH="1" flipV="1">
-            <a:off x="5159424" y="1838458"/>
+            <a:off x="5761210" y="1838458"/>
             <a:ext cx="196" cy="725672"/>
           </a:xfrm>
           <a:prstGeom prst="line">
@@ -5407,7 +5124,7 @@
             <a:solidFill>
               <a:schemeClr val="accent1"/>
             </a:solidFill>
-            <a:prstDash val="dash"/>
+            <a:prstDash val="sysDash"/>
             <a:round/>
             <a:headEnd type="none" w="med" len="med"/>
             <a:tailEnd type="none" w="med" len="med"/>
@@ -5444,7 +5161,7 @@
         </p:nvCxnSpPr>
         <p:spPr>
           <a:xfrm flipV="1">
-            <a:off x="6910305" y="2861407"/>
+            <a:off x="7512091" y="2861407"/>
             <a:ext cx="0" cy="846214"/>
           </a:xfrm>
           <a:prstGeom prst="line">
@@ -5454,7 +5171,7 @@
             <a:solidFill>
               <a:schemeClr val="accent1"/>
             </a:solidFill>
-            <a:prstDash val="dash"/>
+            <a:prstDash val="sysDash"/>
             <a:round/>
             <a:headEnd type="none" w="med" len="med"/>
             <a:tailEnd type="none" w="med" len="med"/>
@@ -5491,7 +5208,7 @@
         </p:nvCxnSpPr>
         <p:spPr>
           <a:xfrm flipV="1">
-            <a:off x="6918484" y="6227878"/>
+            <a:off x="7520270" y="6227878"/>
             <a:ext cx="0" cy="362836"/>
           </a:xfrm>
           <a:prstGeom prst="line">
@@ -5501,7 +5218,7 @@
             <a:solidFill>
               <a:schemeClr val="accent1"/>
             </a:solidFill>
-            <a:prstDash val="dash"/>
+            <a:prstDash val="sysDash"/>
             <a:round/>
             <a:headEnd type="none" w="med" len="med"/>
             <a:tailEnd type="none" w="med" len="med"/>
@@ -5524,10 +5241,10 @@
       </p:cxnSp>
       <p:cxnSp>
         <p:nvCxnSpPr>
-          <p:cNvPr id="161" name="Straight Connector 160">
-            <a:extLst>
-              <a:ext uri="{FF2B5EF4-FFF2-40B4-BE49-F238E27FC236}">
-                <a16:creationId xmlns:a16="http://schemas.microsoft.com/office/drawing/2014/main" id="{CE504190-EC9B-4409-B879-4FE67162834E}"/>
+          <p:cNvPr id="59" name="Straight Arrow Connector 58">
+            <a:extLst>
+              <a:ext uri="{FF2B5EF4-FFF2-40B4-BE49-F238E27FC236}">
+                <a16:creationId xmlns:a16="http://schemas.microsoft.com/office/drawing/2014/main" id="{3D84AED6-ED68-4483-83D9-E6A27F92F878}"/>
               </a:ext>
             </a:extLst>
           </p:cNvPr>
@@ -5537,18 +5254,373 @@
           <p:nvPr/>
         </p:nvCxnSpPr>
         <p:spPr>
+          <a:xfrm>
+            <a:off x="5842785" y="2332886"/>
+            <a:ext cx="977088" cy="0"/>
+          </a:xfrm>
+          <a:prstGeom prst="straightConnector1">
+            <a:avLst/>
+          </a:prstGeom>
+          <a:ln w="25400">
+            <a:headEnd type="none" w="med" len="med"/>
+            <a:tailEnd type="arrow" w="med" len="med"/>
+          </a:ln>
+        </p:spPr>
+        <p:style>
+          <a:lnRef idx="1">
+            <a:schemeClr val="accent1"/>
+          </a:lnRef>
+          <a:fillRef idx="0">
+            <a:schemeClr val="accent1"/>
+          </a:fillRef>
+          <a:effectRef idx="0">
+            <a:schemeClr val="accent1"/>
+          </a:effectRef>
+          <a:fontRef idx="minor">
+            <a:schemeClr val="tx1"/>
+          </a:fontRef>
+        </p:style>
+      </p:cxnSp>
+      <p:sp>
+        <p:nvSpPr>
+          <p:cNvPr id="75" name="Rectangle 74">
+            <a:extLst>
+              <a:ext uri="{FF2B5EF4-FFF2-40B4-BE49-F238E27FC236}">
+                <a16:creationId xmlns:a16="http://schemas.microsoft.com/office/drawing/2014/main" id="{E4C45D89-8F6E-4613-A6DA-925CFF9BB553}"/>
+              </a:ext>
+            </a:extLst>
+          </p:cNvPr>
+          <p:cNvSpPr/>
+          <p:nvPr/>
+        </p:nvSpPr>
+        <p:spPr>
+          <a:xfrm>
+            <a:off x="10792980" y="1857375"/>
+            <a:ext cx="1088859" cy="389789"/>
+          </a:xfrm>
+          <a:prstGeom prst="rect">
+            <a:avLst/>
+          </a:prstGeom>
+          <a:solidFill>
+            <a:srgbClr val="CC99FF"/>
+          </a:solidFill>
+          <a:ln>
+            <a:solidFill>
+              <a:srgbClr val="CC99FF"/>
+            </a:solidFill>
+          </a:ln>
+        </p:spPr>
+        <p:style>
+          <a:lnRef idx="2">
+            <a:schemeClr val="accent1">
+              <a:shade val="50000"/>
+            </a:schemeClr>
+          </a:lnRef>
+          <a:fillRef idx="1">
+            <a:schemeClr val="accent1"/>
+          </a:fillRef>
+          <a:effectRef idx="0">
+            <a:schemeClr val="accent1"/>
+          </a:effectRef>
+          <a:fontRef idx="minor">
+            <a:schemeClr val="lt1"/>
+          </a:fontRef>
+        </p:style>
+        <p:txBody>
+          <a:bodyPr rtlCol="0" anchor="ctr"/>
+          <a:lstStyle/>
+          <a:p>
+            <a:pPr algn="ctr"/>
+            <a:r>
+              <a:rPr lang="en-US" dirty="0"/>
+              <a:t>:Model</a:t>
+            </a:r>
+          </a:p>
+        </p:txBody>
+      </p:sp>
+      <p:sp>
+        <p:nvSpPr>
+          <p:cNvPr id="119" name="Rectangle 118">
+            <a:extLst>
+              <a:ext uri="{FF2B5EF4-FFF2-40B4-BE49-F238E27FC236}">
+                <a16:creationId xmlns:a16="http://schemas.microsoft.com/office/drawing/2014/main" id="{FBC6C0ED-3FCB-454B-B6B1-35E28BA98103}"/>
+              </a:ext>
+            </a:extLst>
+          </p:cNvPr>
+          <p:cNvSpPr/>
+          <p:nvPr/>
+        </p:nvSpPr>
+        <p:spPr>
+          <a:xfrm>
+            <a:off x="11271517" y="4513821"/>
+            <a:ext cx="139369" cy="362460"/>
+          </a:xfrm>
+          <a:prstGeom prst="rect">
+            <a:avLst/>
+          </a:prstGeom>
+          <a:solidFill>
+            <a:srgbClr val="CC99FF"/>
+          </a:solidFill>
+          <a:ln>
+            <a:solidFill>
+              <a:srgbClr val="CC99FF"/>
+            </a:solidFill>
+          </a:ln>
+        </p:spPr>
+        <p:style>
+          <a:lnRef idx="2">
+            <a:schemeClr val="accent1">
+              <a:shade val="50000"/>
+            </a:schemeClr>
+          </a:lnRef>
+          <a:fillRef idx="1">
+            <a:schemeClr val="accent1"/>
+          </a:fillRef>
+          <a:effectRef idx="0">
+            <a:schemeClr val="accent1"/>
+          </a:effectRef>
+          <a:fontRef idx="minor">
+            <a:schemeClr val="lt1"/>
+          </a:fontRef>
+        </p:style>
+        <p:txBody>
+          <a:bodyPr rtlCol="0" anchor="ctr"/>
+          <a:lstStyle/>
+          <a:p>
+            <a:pPr algn="ctr"/>
+            <a:endParaRPr lang="en-US" dirty="0"/>
+          </a:p>
+        </p:txBody>
+      </p:sp>
+      <p:sp>
+        <p:nvSpPr>
+          <p:cNvPr id="122" name="TextBox 121">
+            <a:extLst>
+              <a:ext uri="{FF2B5EF4-FFF2-40B4-BE49-F238E27FC236}">
+                <a16:creationId xmlns:a16="http://schemas.microsoft.com/office/drawing/2014/main" id="{452E36D0-FC17-409D-9ADC-E7B70D4135B9}"/>
+              </a:ext>
+            </a:extLst>
+          </p:cNvPr>
+          <p:cNvSpPr txBox="1"/>
+          <p:nvPr/>
+        </p:nvSpPr>
+        <p:spPr>
+          <a:xfrm>
+            <a:off x="8044963" y="4129534"/>
+            <a:ext cx="3437160" cy="400110"/>
+          </a:xfrm>
+          <a:prstGeom prst="rect">
+            <a:avLst/>
+          </a:prstGeom>
+          <a:noFill/>
+        </p:spPr>
+        <p:txBody>
+          <a:bodyPr wrap="square" rtlCol="0">
+            <a:spAutoFit/>
+          </a:bodyPr>
+          <a:lstStyle/>
+          <a:p>
+            <a:pPr algn="ctr"/>
+            <a:r>
+              <a:rPr lang="en-US" sz="1400" dirty="0" err="1">
+                <a:solidFill>
+                  <a:srgbClr val="9900CC"/>
+                </a:solidFill>
+              </a:rPr>
+              <a:t>updateFilteredPersonList</a:t>
+            </a:r>
+            <a:r>
+              <a:rPr lang="en-US" sz="2000" dirty="0">
+                <a:solidFill>
+                  <a:srgbClr val="9900CC"/>
+                </a:solidFill>
+              </a:rPr>
+              <a:t>(</a:t>
+            </a:r>
+            <a:r>
+              <a:rPr lang="en-US" sz="1400" dirty="0">
+                <a:solidFill>
+                  <a:srgbClr val="9900CC"/>
+                </a:solidFill>
+              </a:rPr>
+              <a:t>predicate</a:t>
+            </a:r>
+            <a:r>
+              <a:rPr lang="en-US" sz="2000" dirty="0">
+                <a:solidFill>
+                  <a:srgbClr val="9900CC"/>
+                </a:solidFill>
+              </a:rPr>
+              <a:t>)</a:t>
+            </a:r>
+          </a:p>
+        </p:txBody>
+      </p:sp>
+      <p:cxnSp>
+        <p:nvCxnSpPr>
+          <p:cNvPr id="162" name="Straight Connector 161">
+            <a:extLst>
+              <a:ext uri="{FF2B5EF4-FFF2-40B4-BE49-F238E27FC236}">
+                <a16:creationId xmlns:a16="http://schemas.microsoft.com/office/drawing/2014/main" id="{2F091FA5-B34E-489F-A20B-D77A3F7D6CDF}"/>
+              </a:ext>
+            </a:extLst>
+          </p:cNvPr>
+          <p:cNvCxnSpPr>
+            <a:cxnSpLocks/>
+          </p:cNvCxnSpPr>
+          <p:nvPr/>
+        </p:nvCxnSpPr>
+        <p:spPr>
           <a:xfrm flipV="1">
-            <a:off x="8525581" y="3562238"/>
-            <a:ext cx="0" cy="382388"/>
+            <a:off x="11337409" y="4825076"/>
+            <a:ext cx="0" cy="1268515"/>
           </a:xfrm>
           <a:prstGeom prst="line">
             <a:avLst/>
           </a:prstGeom>
           <a:ln w="25400" cap="flat" cmpd="sng" algn="ctr">
             <a:solidFill>
-              <a:schemeClr val="accent1"/>
+              <a:srgbClr val="CC99FF"/>
             </a:solidFill>
-            <a:prstDash val="dash"/>
+            <a:prstDash val="sysDash"/>
+            <a:round/>
+            <a:headEnd type="none" w="med" len="med"/>
+            <a:tailEnd type="none" w="med" len="med"/>
+          </a:ln>
+        </p:spPr>
+        <p:style>
+          <a:lnRef idx="0">
+            <a:scrgbClr r="0" g="0" b="0"/>
+          </a:lnRef>
+          <a:fillRef idx="0">
+            <a:scrgbClr r="0" g="0" b="0"/>
+          </a:fillRef>
+          <a:effectRef idx="0">
+            <a:scrgbClr r="0" g="0" b="0"/>
+          </a:effectRef>
+          <a:fontRef idx="minor">
+            <a:schemeClr val="tx1"/>
+          </a:fontRef>
+        </p:style>
+      </p:cxnSp>
+      <p:sp>
+        <p:nvSpPr>
+          <p:cNvPr id="35" name="Rectangle 34">
+            <a:extLst>
+              <a:ext uri="{FF2B5EF4-FFF2-40B4-BE49-F238E27FC236}">
+                <a16:creationId xmlns:a16="http://schemas.microsoft.com/office/drawing/2014/main" id="{70BBFC94-AB3C-4A61-ABF5-C4BE637D4D38}"/>
+              </a:ext>
+            </a:extLst>
+          </p:cNvPr>
+          <p:cNvSpPr/>
+          <p:nvPr/>
+        </p:nvSpPr>
+        <p:spPr>
+          <a:xfrm>
+            <a:off x="7451342" y="3715327"/>
+            <a:ext cx="144511" cy="2583837"/>
+          </a:xfrm>
+          <a:prstGeom prst="rect">
+            <a:avLst/>
+          </a:prstGeom>
+          <a:ln>
+            <a:noFill/>
+          </a:ln>
+        </p:spPr>
+        <p:style>
+          <a:lnRef idx="2">
+            <a:schemeClr val="accent1">
+              <a:shade val="50000"/>
+            </a:schemeClr>
+          </a:lnRef>
+          <a:fillRef idx="1">
+            <a:schemeClr val="accent1"/>
+          </a:fillRef>
+          <a:effectRef idx="0">
+            <a:schemeClr val="accent1"/>
+          </a:effectRef>
+          <a:fontRef idx="minor">
+            <a:schemeClr val="lt1"/>
+          </a:fontRef>
+        </p:style>
+        <p:txBody>
+          <a:bodyPr rtlCol="0" anchor="ctr"/>
+          <a:lstStyle/>
+          <a:p>
+            <a:pPr algn="ctr"/>
+            <a:endParaRPr lang="en-US" dirty="0"/>
+          </a:p>
+        </p:txBody>
+      </p:sp>
+      <p:cxnSp>
+        <p:nvCxnSpPr>
+          <p:cNvPr id="120" name="Straight Arrow Connector 119">
+            <a:extLst>
+              <a:ext uri="{FF2B5EF4-FFF2-40B4-BE49-F238E27FC236}">
+                <a16:creationId xmlns:a16="http://schemas.microsoft.com/office/drawing/2014/main" id="{2D1FCE9E-57FC-4637-A36F-ACBFD9F3B778}"/>
+              </a:ext>
+            </a:extLst>
+          </p:cNvPr>
+          <p:cNvCxnSpPr>
+            <a:cxnSpLocks/>
+          </p:cNvCxnSpPr>
+          <p:nvPr/>
+        </p:nvCxnSpPr>
+        <p:spPr>
+          <a:xfrm>
+            <a:off x="7595853" y="4538972"/>
+            <a:ext cx="3667849" cy="0"/>
+          </a:xfrm>
+          <a:prstGeom prst="straightConnector1">
+            <a:avLst/>
+          </a:prstGeom>
+          <a:ln w="25400">
+            <a:tailEnd type="triangle"/>
+          </a:ln>
+        </p:spPr>
+        <p:style>
+          <a:lnRef idx="1">
+            <a:schemeClr val="accent1"/>
+          </a:lnRef>
+          <a:fillRef idx="0">
+            <a:schemeClr val="accent1"/>
+          </a:fillRef>
+          <a:effectRef idx="0">
+            <a:schemeClr val="accent1"/>
+          </a:effectRef>
+          <a:fontRef idx="minor">
+            <a:schemeClr val="tx1"/>
+          </a:fontRef>
+        </p:style>
+      </p:cxnSp>
+      <p:cxnSp>
+        <p:nvCxnSpPr>
+          <p:cNvPr id="161" name="Straight Connector 160">
+            <a:extLst>
+              <a:ext uri="{FF2B5EF4-FFF2-40B4-BE49-F238E27FC236}">
+                <a16:creationId xmlns:a16="http://schemas.microsoft.com/office/drawing/2014/main" id="{CE504190-EC9B-4409-B879-4FE67162834E}"/>
+              </a:ext>
+            </a:extLst>
+          </p:cNvPr>
+          <p:cNvCxnSpPr>
+            <a:cxnSpLocks/>
+            <a:endCxn id="75" idx="2"/>
+          </p:cNvCxnSpPr>
+          <p:nvPr/>
+        </p:nvCxnSpPr>
+        <p:spPr>
+          <a:xfrm flipV="1">
+            <a:off x="11337410" y="2247164"/>
+            <a:ext cx="0" cy="2257329"/>
+          </a:xfrm>
+          <a:prstGeom prst="line">
+            <a:avLst/>
+          </a:prstGeom>
+          <a:ln w="25400" cap="flat" cmpd="sng" algn="ctr">
+            <a:solidFill>
+              <a:srgbClr val="CC99FF"/>
+            </a:solidFill>
+            <a:prstDash val="sysDash"/>
             <a:round/>
             <a:headEnd type="none" w="med" len="med"/>
             <a:tailEnd type="none" w="med" len="med"/>
@@ -5571,45 +5643,41 @@
       </p:cxnSp>
       <p:cxnSp>
         <p:nvCxnSpPr>
-          <p:cNvPr id="162" name="Straight Connector 161">
-            <a:extLst>
-              <a:ext uri="{FF2B5EF4-FFF2-40B4-BE49-F238E27FC236}">
-                <a16:creationId xmlns:a16="http://schemas.microsoft.com/office/drawing/2014/main" id="{2F091FA5-B34E-489F-A20B-D77A3F7D6CDF}"/>
-              </a:ext>
-            </a:extLst>
-          </p:cNvPr>
-          <p:cNvCxnSpPr>
-            <a:cxnSpLocks/>
-          </p:cNvCxnSpPr>
+          <p:cNvPr id="30" name="Straight Connector 29">
+            <a:extLst>
+              <a:ext uri="{FF2B5EF4-FFF2-40B4-BE49-F238E27FC236}">
+                <a16:creationId xmlns:a16="http://schemas.microsoft.com/office/drawing/2014/main" id="{4E6E3E9D-8DE8-45B1-9083-0FDD9B137E49}"/>
+              </a:ext>
+            </a:extLst>
+          </p:cNvPr>
+          <p:cNvCxnSpPr/>
           <p:nvPr/>
         </p:nvCxnSpPr>
         <p:spPr>
-          <a:xfrm flipV="1">
-            <a:off x="8523867" y="4746837"/>
-            <a:ext cx="0" cy="270626"/>
+          <a:xfrm>
+            <a:off x="5682671" y="3292329"/>
+            <a:ext cx="160114" cy="146108"/>
           </a:xfrm>
           <a:prstGeom prst="line">
             <a:avLst/>
           </a:prstGeom>
-          <a:ln w="25400" cap="flat" cmpd="sng" algn="ctr">
+          <a:ln w="25400">
             <a:solidFill>
-              <a:schemeClr val="accent1"/>
+              <a:schemeClr val="accent1">
+                <a:lumMod val="50000"/>
+              </a:schemeClr>
             </a:solidFill>
-            <a:prstDash val="dash"/>
-            <a:round/>
-            <a:headEnd type="none" w="med" len="med"/>
-            <a:tailEnd type="none" w="med" len="med"/>
           </a:ln>
         </p:spPr>
         <p:style>
-          <a:lnRef idx="0">
-            <a:scrgbClr r="0" g="0" b="0"/>
+          <a:lnRef idx="1">
+            <a:schemeClr val="accent1"/>
           </a:lnRef>
           <a:fillRef idx="0">
-            <a:scrgbClr r="0" g="0" b="0"/>
+            <a:schemeClr val="accent1"/>
           </a:fillRef>
           <a:effectRef idx="0">
-            <a:scrgbClr r="0" g="0" b="0"/>
+            <a:schemeClr val="accent1"/>
           </a:effectRef>
           <a:fontRef idx="minor">
             <a:schemeClr val="tx1"/>
@@ -5618,10 +5686,114 @@
       </p:cxnSp>
       <p:cxnSp>
         <p:nvCxnSpPr>
-          <p:cNvPr id="178" name="Straight Connector 177">
-            <a:extLst>
-              <a:ext uri="{FF2B5EF4-FFF2-40B4-BE49-F238E27FC236}">
-                <a16:creationId xmlns:a16="http://schemas.microsoft.com/office/drawing/2014/main" id="{AB722DD0-08C2-47A4-9846-A76E77BA9B11}"/>
+          <p:cNvPr id="32" name="Straight Connector 31">
+            <a:extLst>
+              <a:ext uri="{FF2B5EF4-FFF2-40B4-BE49-F238E27FC236}">
+                <a16:creationId xmlns:a16="http://schemas.microsoft.com/office/drawing/2014/main" id="{617692A6-2F4F-4094-BC71-39E705A30DC8}"/>
+              </a:ext>
+            </a:extLst>
+          </p:cNvPr>
+          <p:cNvCxnSpPr/>
+          <p:nvPr/>
+        </p:nvCxnSpPr>
+        <p:spPr>
+          <a:xfrm flipH="1">
+            <a:off x="5685781" y="3265313"/>
+            <a:ext cx="149189" cy="180939"/>
+          </a:xfrm>
+          <a:prstGeom prst="line">
+            <a:avLst/>
+          </a:prstGeom>
+          <a:ln w="25400">
+            <a:solidFill>
+              <a:schemeClr val="accent1">
+                <a:lumMod val="50000"/>
+              </a:schemeClr>
+            </a:solidFill>
+          </a:ln>
+        </p:spPr>
+        <p:style>
+          <a:lnRef idx="1">
+            <a:schemeClr val="accent1"/>
+          </a:lnRef>
+          <a:fillRef idx="0">
+            <a:schemeClr val="accent1"/>
+          </a:fillRef>
+          <a:effectRef idx="0">
+            <a:schemeClr val="accent1"/>
+          </a:effectRef>
+          <a:fontRef idx="minor">
+            <a:schemeClr val="tx1"/>
+          </a:fontRef>
+        </p:style>
+      </p:cxnSp>
+      <p:sp>
+        <p:nvSpPr>
+          <p:cNvPr id="104" name="Rectangle 103">
+            <a:extLst>
+              <a:ext uri="{FF2B5EF4-FFF2-40B4-BE49-F238E27FC236}">
+                <a16:creationId xmlns:a16="http://schemas.microsoft.com/office/drawing/2014/main" id="{AD3CD97A-A4B6-43B5-8148-F11624847ACC}"/>
+              </a:ext>
+            </a:extLst>
+          </p:cNvPr>
+          <p:cNvSpPr/>
+          <p:nvPr/>
+        </p:nvSpPr>
+        <p:spPr>
+          <a:xfrm>
+            <a:off x="8477495" y="1981934"/>
+            <a:ext cx="2003366" cy="618857"/>
+          </a:xfrm>
+          <a:prstGeom prst="rect">
+            <a:avLst/>
+          </a:prstGeom>
+          <a:ln>
+            <a:noFill/>
+          </a:ln>
+        </p:spPr>
+        <p:style>
+          <a:lnRef idx="2">
+            <a:schemeClr val="accent1">
+              <a:shade val="50000"/>
+            </a:schemeClr>
+          </a:lnRef>
+          <a:fillRef idx="1">
+            <a:schemeClr val="accent1"/>
+          </a:fillRef>
+          <a:effectRef idx="0">
+            <a:schemeClr val="accent1"/>
+          </a:effectRef>
+          <a:fontRef idx="minor">
+            <a:schemeClr val="lt1"/>
+          </a:fontRef>
+        </p:style>
+        <p:txBody>
+          <a:bodyPr rtlCol="0" anchor="ctr"/>
+          <a:lstStyle/>
+          <a:p>
+            <a:pPr algn="ctr"/>
+            <a:r>
+              <a:rPr lang="en-US" sz="1600" dirty="0" err="1"/>
+              <a:t>predicate:TagContains</a:t>
+            </a:r>
+            <a:endParaRPr lang="en-US" sz="1600" dirty="0"/>
+          </a:p>
+          <a:p>
+            <a:pPr algn="ctr"/>
+            <a:r>
+              <a:rPr lang="en-US" sz="1600" dirty="0" err="1"/>
+              <a:t>KeywordPredicate</a:t>
+            </a:r>
+            <a:endParaRPr lang="en-US" sz="1600" dirty="0"/>
+          </a:p>
+        </p:txBody>
+      </p:sp>
+      <p:cxnSp>
+        <p:nvCxnSpPr>
+          <p:cNvPr id="107" name="Straight Arrow Connector 106">
+            <a:extLst>
+              <a:ext uri="{FF2B5EF4-FFF2-40B4-BE49-F238E27FC236}">
+                <a16:creationId xmlns:a16="http://schemas.microsoft.com/office/drawing/2014/main" id="{B29DCD7E-79E9-4DC9-871C-5CE992248931}"/>
               </a:ext>
             </a:extLst>
           </p:cNvPr>
@@ -5631,32 +5803,27 @@
           <p:nvPr/>
         </p:nvCxnSpPr>
         <p:spPr>
-          <a:xfrm flipV="1">
-            <a:off x="10537808" y="5717913"/>
-            <a:ext cx="0" cy="362836"/>
-          </a:xfrm>
-          <a:prstGeom prst="line">
+          <a:xfrm>
+            <a:off x="7508467" y="2489829"/>
+            <a:ext cx="977088" cy="0"/>
+          </a:xfrm>
+          <a:prstGeom prst="straightConnector1">
             <a:avLst/>
           </a:prstGeom>
-          <a:ln w="25400" cap="flat" cmpd="sng" algn="ctr">
-            <a:solidFill>
-              <a:schemeClr val="accent1"/>
-            </a:solidFill>
-            <a:prstDash val="dash"/>
-            <a:round/>
+          <a:ln w="25400">
             <a:headEnd type="none" w="med" len="med"/>
-            <a:tailEnd type="none" w="med" len="med"/>
+            <a:tailEnd type="arrow" w="med" len="med"/>
           </a:ln>
         </p:spPr>
         <p:style>
-          <a:lnRef idx="0">
-            <a:scrgbClr r="0" g="0" b="0"/>
+          <a:lnRef idx="1">
+            <a:schemeClr val="accent1"/>
           </a:lnRef>
           <a:fillRef idx="0">
-            <a:scrgbClr r="0" g="0" b="0"/>
+            <a:schemeClr val="accent1"/>
           </a:fillRef>
           <a:effectRef idx="0">
-            <a:scrgbClr r="0" g="0" b="0"/>
+            <a:schemeClr val="accent1"/>
           </a:effectRef>
           <a:fontRef idx="minor">
             <a:schemeClr val="tx1"/>
@@ -5665,10 +5832,10 @@
       </p:cxnSp>
       <p:cxnSp>
         <p:nvCxnSpPr>
-          <p:cNvPr id="180" name="Straight Arrow Connector 179">
-            <a:extLst>
-              <a:ext uri="{FF2B5EF4-FFF2-40B4-BE49-F238E27FC236}">
-                <a16:creationId xmlns:a16="http://schemas.microsoft.com/office/drawing/2014/main" id="{C575B5D9-1934-498E-9507-D54847DF03D6}"/>
+          <p:cNvPr id="108" name="Straight Arrow Connector 107">
+            <a:extLst>
+              <a:ext uri="{FF2B5EF4-FFF2-40B4-BE49-F238E27FC236}">
+                <a16:creationId xmlns:a16="http://schemas.microsoft.com/office/drawing/2014/main" id="{2CC7963F-F5E7-4447-9005-1468E0DB5657}"/>
               </a:ext>
             </a:extLst>
           </p:cNvPr>
@@ -5678,15 +5845,17 @@
           <p:nvPr/>
         </p:nvCxnSpPr>
         <p:spPr>
-          <a:xfrm>
-            <a:off x="7005796" y="2497532"/>
-            <a:ext cx="1508056" cy="0"/>
+          <a:xfrm flipH="1">
+            <a:off x="7578694" y="2770642"/>
+            <a:ext cx="1844982" cy="0"/>
           </a:xfrm>
           <a:prstGeom prst="straightConnector1">
             <a:avLst/>
           </a:prstGeom>
           <a:ln w="25400">
-            <a:tailEnd type="triangle"/>
+            <a:prstDash val="sysDash"/>
+            <a:headEnd type="none" w="med" len="med"/>
+            <a:tailEnd type="arrow" w="med" len="med"/>
           </a:ln>
         </p:spPr>
         <p:style>
@@ -5706,10 +5875,10 @@
       </p:cxnSp>
       <p:sp>
         <p:nvSpPr>
-          <p:cNvPr id="182" name="Rectangle 181">
-            <a:extLst>
-              <a:ext uri="{FF2B5EF4-FFF2-40B4-BE49-F238E27FC236}">
-                <a16:creationId xmlns:a16="http://schemas.microsoft.com/office/drawing/2014/main" id="{A2B09624-BE54-446B-ABE4-89B9CFAB9363}"/>
+          <p:cNvPr id="109" name="Rectangle 108">
+            <a:extLst>
+              <a:ext uri="{FF2B5EF4-FFF2-40B4-BE49-F238E27FC236}">
+                <a16:creationId xmlns:a16="http://schemas.microsoft.com/office/drawing/2014/main" id="{AD053706-0EE8-4BD6-BF97-AD210910EE6D}"/>
               </a:ext>
             </a:extLst>
           </p:cNvPr>
@@ -5718,8 +5887,8 @@
         </p:nvSpPr>
         <p:spPr>
           <a:xfrm>
-            <a:off x="8523866" y="2029421"/>
-            <a:ext cx="1844637" cy="561974"/>
+            <a:off x="9423676" y="2589703"/>
+            <a:ext cx="204721" cy="208318"/>
           </a:xfrm>
           <a:prstGeom prst="rect">
             <a:avLst/>
@@ -5749,77 +5918,16 @@
           <a:lstStyle/>
           <a:p>
             <a:pPr algn="ctr"/>
-            <a:r>
-              <a:rPr lang="en-US" sz="1400" dirty="0" err="1"/>
-              <a:t>predicate:TagContains</a:t>
-            </a:r>
-            <a:endParaRPr lang="en-US" sz="1400" dirty="0"/>
-          </a:p>
-          <a:p>
-            <a:pPr algn="ctr"/>
-            <a:r>
-              <a:rPr lang="en-US" sz="1400" dirty="0" err="1"/>
-              <a:t>KeywordPredicate</a:t>
-            </a:r>
-            <a:endParaRPr lang="en-US" sz="1400" dirty="0"/>
-          </a:p>
-        </p:txBody>
-      </p:sp>
-      <p:sp>
-        <p:nvSpPr>
-          <p:cNvPr id="183" name="Rectangle 182">
-            <a:extLst>
-              <a:ext uri="{FF2B5EF4-FFF2-40B4-BE49-F238E27FC236}">
-                <a16:creationId xmlns:a16="http://schemas.microsoft.com/office/drawing/2014/main" id="{67EA464F-68F8-4094-85C0-622720B4AFE2}"/>
-              </a:ext>
-            </a:extLst>
-          </p:cNvPr>
-          <p:cNvSpPr/>
-          <p:nvPr/>
-        </p:nvSpPr>
-        <p:spPr>
-          <a:xfrm>
-            <a:off x="9369109" y="2558041"/>
-            <a:ext cx="154150" cy="206910"/>
-          </a:xfrm>
-          <a:prstGeom prst="rect">
-            <a:avLst/>
-          </a:prstGeom>
-          <a:ln>
-            <a:noFill/>
-          </a:ln>
-        </p:spPr>
-        <p:style>
-          <a:lnRef idx="2">
-            <a:schemeClr val="accent1">
-              <a:shade val="50000"/>
-            </a:schemeClr>
-          </a:lnRef>
-          <a:fillRef idx="1">
-            <a:schemeClr val="accent1"/>
-          </a:fillRef>
-          <a:effectRef idx="0">
-            <a:schemeClr val="accent1"/>
-          </a:effectRef>
-          <a:fontRef idx="minor">
-            <a:schemeClr val="lt1"/>
-          </a:fontRef>
-        </p:style>
-        <p:txBody>
-          <a:bodyPr rtlCol="0" anchor="ctr"/>
-          <a:lstStyle/>
-          <a:p>
-            <a:pPr algn="ctr"/>
             <a:endParaRPr lang="en-US" dirty="0"/>
           </a:p>
         </p:txBody>
       </p:sp>
       <p:cxnSp>
         <p:nvCxnSpPr>
-          <p:cNvPr id="184" name="Straight Arrow Connector 183">
-            <a:extLst>
-              <a:ext uri="{FF2B5EF4-FFF2-40B4-BE49-F238E27FC236}">
-                <a16:creationId xmlns:a16="http://schemas.microsoft.com/office/drawing/2014/main" id="{B6BD8E1F-2B9A-40A3-8103-C126A0E2033E}"/>
+          <p:cNvPr id="114" name="Straight Arrow Connector 113">
+            <a:extLst>
+              <a:ext uri="{FF2B5EF4-FFF2-40B4-BE49-F238E27FC236}">
+                <a16:creationId xmlns:a16="http://schemas.microsoft.com/office/drawing/2014/main" id="{823F5301-0B0D-4725-B47D-1F586BD6EC10}"/>
               </a:ext>
             </a:extLst>
           </p:cNvPr>
@@ -5830,15 +5938,19 @@
         </p:nvCxnSpPr>
         <p:spPr>
           <a:xfrm flipH="1">
-            <a:off x="7005796" y="2752442"/>
-            <a:ext cx="2356732" cy="0"/>
+            <a:off x="7595853" y="4868466"/>
+            <a:ext cx="3667849" cy="0"/>
           </a:xfrm>
           <a:prstGeom prst="straightConnector1">
             <a:avLst/>
           </a:prstGeom>
           <a:ln w="25400">
-            <a:prstDash val="dash"/>
-            <a:tailEnd type="triangle"/>
+            <a:solidFill>
+              <a:srgbClr val="CC99FF"/>
+            </a:solidFill>
+            <a:prstDash val="sysDash"/>
+            <a:headEnd type="none" w="med" len="med"/>
+            <a:tailEnd type="arrow" w="med" len="med"/>
           </a:ln>
         </p:spPr>
         <p:style>
@@ -5850,95 +5962,6 @@
           </a:fillRef>
           <a:effectRef idx="0">
             <a:schemeClr val="accent1"/>
-          </a:effectRef>
-          <a:fontRef idx="minor">
-            <a:schemeClr val="tx1"/>
-          </a:fontRef>
-        </p:style>
-      </p:cxnSp>
-      <p:cxnSp>
-        <p:nvCxnSpPr>
-          <p:cNvPr id="187" name="Straight Arrow Connector 186">
-            <a:extLst>
-              <a:ext uri="{FF2B5EF4-FFF2-40B4-BE49-F238E27FC236}">
-                <a16:creationId xmlns:a16="http://schemas.microsoft.com/office/drawing/2014/main" id="{6E4A4754-E139-4A84-841D-387613D5F9D4}"/>
-              </a:ext>
-            </a:extLst>
-          </p:cNvPr>
-          <p:cNvCxnSpPr>
-            <a:cxnSpLocks/>
-          </p:cNvCxnSpPr>
-          <p:nvPr/>
-        </p:nvCxnSpPr>
-        <p:spPr>
-          <a:xfrm flipH="1" flipV="1">
-            <a:off x="6995783" y="4725601"/>
-            <a:ext cx="1534216" cy="5334"/>
-          </a:xfrm>
-          <a:prstGeom prst="straightConnector1">
-            <a:avLst/>
-          </a:prstGeom>
-          <a:ln w="25400">
-            <a:prstDash val="dash"/>
-            <a:tailEnd type="triangle"/>
-          </a:ln>
-        </p:spPr>
-        <p:style>
-          <a:lnRef idx="1">
-            <a:schemeClr val="accent1"/>
-          </a:lnRef>
-          <a:fillRef idx="0">
-            <a:schemeClr val="accent1"/>
-          </a:fillRef>
-          <a:effectRef idx="0">
-            <a:schemeClr val="accent1"/>
-          </a:effectRef>
-          <a:fontRef idx="minor">
-            <a:schemeClr val="tx1"/>
-          </a:fontRef>
-        </p:style>
-      </p:cxnSp>
-      <p:cxnSp>
-        <p:nvCxnSpPr>
-          <p:cNvPr id="201" name="Straight Connector 200">
-            <a:extLst>
-              <a:ext uri="{FF2B5EF4-FFF2-40B4-BE49-F238E27FC236}">
-                <a16:creationId xmlns:a16="http://schemas.microsoft.com/office/drawing/2014/main" id="{E6D20392-C23D-4951-85EC-AE592388540B}"/>
-              </a:ext>
-            </a:extLst>
-          </p:cNvPr>
-          <p:cNvCxnSpPr>
-            <a:cxnSpLocks/>
-          </p:cNvCxnSpPr>
-          <p:nvPr/>
-        </p:nvCxnSpPr>
-        <p:spPr>
-          <a:xfrm flipV="1">
-            <a:off x="9446184" y="2665696"/>
-            <a:ext cx="0" cy="391815"/>
-          </a:xfrm>
-          <a:prstGeom prst="line">
-            <a:avLst/>
-          </a:prstGeom>
-          <a:ln w="25400" cap="flat" cmpd="sng" algn="ctr">
-            <a:solidFill>
-              <a:schemeClr val="accent1"/>
-            </a:solidFill>
-            <a:prstDash val="dash"/>
-            <a:round/>
-            <a:headEnd type="none" w="med" len="med"/>
-            <a:tailEnd type="none" w="med" len="med"/>
-          </a:ln>
-        </p:spPr>
-        <p:style>
-          <a:lnRef idx="0">
-            <a:scrgbClr r="0" g="0" b="0"/>
-          </a:lnRef>
-          <a:fillRef idx="0">
-            <a:scrgbClr r="0" g="0" b="0"/>
-          </a:fillRef>
-          <a:effectRef idx="0">
-            <a:scrgbClr r="0" g="0" b="0"/>
           </a:effectRef>
           <a:fontRef idx="minor">
             <a:schemeClr val="tx1"/>

</xml_diff>

<commit_message>
DeveloperGuide: Add retag sequence diagram, update untag and retrieve sequence diagrams
</commit_message>
<xml_diff>
--- a/docs/diagrams/RetrieveSequenceDiagram.pptx
+++ b/docs/diagrams/RetrieveSequenceDiagram.pptx
@@ -3490,9 +3490,10 @@
           <a:p>
             <a:pPr algn="ctr"/>
             <a:r>
-              <a:rPr lang="en-US" sz="1600" dirty="0"/>
-              <a:t>r:Retrieve</a:t>
-            </a:r>
+              <a:rPr lang="en-US" sz="1600" dirty="0" err="1"/>
+              <a:t>re:Retrieve</a:t>
+            </a:r>
+            <a:endParaRPr lang="en-US" sz="1600" dirty="0"/>
           </a:p>
           <a:p>
             <a:pPr algn="ctr"/>
@@ -4212,7 +4213,7 @@
         <p:spPr>
           <a:xfrm>
             <a:off x="3297833" y="2969893"/>
-            <a:ext cx="359125" cy="369332"/>
+            <a:ext cx="403100" cy="369332"/>
           </a:xfrm>
           <a:prstGeom prst="rect">
             <a:avLst/>
@@ -4231,7 +4232,7 @@
                   <a:schemeClr val="accent1"/>
                 </a:solidFill>
               </a:rPr>
-              <a:t>r</a:t>
+              <a:t>re</a:t>
             </a:r>
           </a:p>
         </p:txBody>
@@ -4757,7 +4758,7 @@
         <p:spPr>
           <a:xfrm>
             <a:off x="5001182" y="2617236"/>
-            <a:ext cx="359125" cy="369332"/>
+            <a:ext cx="404554" cy="369332"/>
           </a:xfrm>
           <a:prstGeom prst="rect">
             <a:avLst/>
@@ -4776,7 +4777,7 @@
                   <a:schemeClr val="accent1"/>
                 </a:solidFill>
               </a:rPr>
-              <a:t>r</a:t>
+              <a:t>re</a:t>
             </a:r>
           </a:p>
         </p:txBody>

</xml_diff>